<commit_message>
Deploy springboot using kubernetes
Deploy springboot using kubernetes
</commit_message>
<xml_diff>
--- a/docs/_Deploy Telenor Jar Into Docker In Ubuntu Server.pptx
+++ b/docs/_Deploy Telenor Jar Into Docker In Ubuntu Server.pptx
@@ -6751,7 +6751,7 @@
             </a:pPr>
             <a:r>
               <a:rPr lang="en"/>
-              <a:t>sudo snap install docker (Other dependencies of other docker packages)</a:t>
+              <a:t>systemctl start docker - start Docker </a:t>
             </a:r>
             <a:endParaRPr/>
           </a:p>
@@ -6768,7 +6768,24 @@
             </a:pPr>
             <a:r>
               <a:rPr lang="en"/>
-              <a:t>ocker --version (Check docker version)</a:t>
+              <a:t>sudo snap install docker (Other dependencies of other docker packages)</a:t>
+            </a:r>
+            <a:endParaRPr/>
+          </a:p>
+          <a:p>
+            <a:pPr indent="-342900" lvl="0" marL="457200" rtl="0" algn="l">
+              <a:spcBef>
+                <a:spcPts val="0"/>
+              </a:spcBef>
+              <a:spcAft>
+                <a:spcPts val="0"/>
+              </a:spcAft>
+              <a:buSzPts val="1800"/>
+              <a:buAutoNum type="arabicPeriod"/>
+            </a:pPr>
+            <a:r>
+              <a:rPr lang="en"/>
+              <a:t>docker --version (Check docker version)</a:t>
             </a:r>
             <a:endParaRPr/>
           </a:p>

</xml_diff>